<commit_message>
Updated debugging in java
Updated debugging in java
</commit_message>
<xml_diff>
--- a/HowToDebug/Calculator/src/main/resources/DebugInJava.pptx
+++ b/HowToDebug/Calculator/src/main/resources/DebugInJava.pptx
@@ -192,6 +192,7 @@
           <a:p>
             <a:fld id="{E5CC3754-FA98-4789-B03C-8C71D0B501E0}" type="datetimeFigureOut">
               <a:rPr lang="en-US" smtClean="0"/>
+              <a:pPr/>
               <a:t>4/18/2020</a:t>
             </a:fld>
             <a:endParaRPr lang="en-US"/>
@@ -353,6 +354,7 @@
           <a:p>
             <a:fld id="{BD0CCCDC-3066-4F52-A2F8-690842B190DE}" type="slidenum">
               <a:rPr lang="en-US" smtClean="0"/>
+              <a:pPr/>
               <a:t>‹#›</a:t>
             </a:fld>
             <a:endParaRPr lang="en-US"/>
@@ -493,6 +495,7 @@
           <a:p>
             <a:fld id="{B605A1C7-C579-4A48-9D7D-6231E4AEAE1C}" type="datetime1">
               <a:rPr lang="en-US" smtClean="0"/>
+              <a:pPr/>
               <a:t>4/18/2020</a:t>
             </a:fld>
             <a:endParaRPr lang="en-US"/>
@@ -1215,6 +1218,7 @@
           <a:p>
             <a:fld id="{E016A7BD-BCBA-4E9F-B6C3-2F59B4ABE7A6}" type="datetime1">
               <a:rPr lang="en-US" smtClean="0"/>
+              <a:pPr/>
               <a:t>4/18/2020</a:t>
             </a:fld>
             <a:endParaRPr lang="en-US"/>
@@ -1405,6 +1409,7 @@
           <a:p>
             <a:fld id="{F4B6E4B7-9746-4E04-821E-BFB2CC17691F}" type="datetime1">
               <a:rPr lang="en-US" smtClean="0"/>
+              <a:pPr/>
               <a:t>4/18/2020</a:t>
             </a:fld>
             <a:endParaRPr lang="en-US"/>
@@ -1585,6 +1590,7 @@
           <a:p>
             <a:fld id="{1389327E-8079-4BA3-BBE1-C26F5385FEF4}" type="datetime1">
               <a:rPr lang="en-US" smtClean="0"/>
+              <a:pPr/>
               <a:t>4/18/2020</a:t>
             </a:fld>
             <a:endParaRPr lang="en-US"/>
@@ -3073,6 +3079,7 @@
           <a:p>
             <a:fld id="{0D23E934-CB72-4B6B-8E08-0497BCAE23DF}" type="datetime1">
               <a:rPr lang="en-US" smtClean="0"/>
+              <a:pPr/>
               <a:t>4/18/2020</a:t>
             </a:fld>
             <a:endParaRPr lang="en-US"/>
@@ -3678,6 +3685,7 @@
           <a:p>
             <a:fld id="{8BBB9921-0C4F-4421-BA6C-84F47F20BCB7}" type="datetime1">
               <a:rPr lang="en-US" smtClean="0"/>
+              <a:pPr/>
               <a:t>4/18/2020</a:t>
             </a:fld>
             <a:endParaRPr lang="en-US"/>
@@ -4120,6 +4128,7 @@
           <a:p>
             <a:fld id="{D7D256E1-681E-4268-B46A-C83CB075219A}" type="datetime1">
               <a:rPr lang="en-US" smtClean="0"/>
+              <a:pPr/>
               <a:t>4/18/2020</a:t>
             </a:fld>
             <a:endParaRPr lang="en-US"/>
@@ -4686,6 +4695,7 @@
           <a:p>
             <a:fld id="{D558509B-5088-4D72-80E3-58DACA9221E0}" type="datetime1">
               <a:rPr lang="en-US" smtClean="0"/>
+              <a:pPr/>
               <a:t>4/18/2020</a:t>
             </a:fld>
             <a:endParaRPr lang="en-US"/>
@@ -4787,6 +4797,7 @@
           <a:p>
             <a:fld id="{C3A883B1-17CF-464D-B6D0-E6E3F3AA698B}" type="datetime1">
               <a:rPr lang="en-US" smtClean="0"/>
+              <a:pPr/>
               <a:t>4/18/2020</a:t>
             </a:fld>
             <a:endParaRPr lang="en-US"/>
@@ -5046,6 +5057,7 @@
           <a:p>
             <a:fld id="{8C371CD5-FB4B-4D53-A8AF-9E22005448A0}" type="datetime1">
               <a:rPr lang="en-US" smtClean="0"/>
+              <a:pPr/>
               <a:t>4/18/2020</a:t>
             </a:fld>
             <a:endParaRPr lang="en-US"/>
@@ -5772,6 +5784,7 @@
           <a:p>
             <a:fld id="{14BE3480-500D-46BA-8E4E-1949B8D977E4}" type="datetime1">
               <a:rPr lang="en-US" smtClean="0"/>
+              <a:pPr/>
               <a:t>4/18/2020</a:t>
             </a:fld>
             <a:endParaRPr lang="en-US"/>
@@ -6450,6 +6463,7 @@
           <a:p>
             <a:fld id="{23CC6A4F-6939-4CFD-9534-CA02FDBC1704}" type="datetime1">
               <a:rPr lang="en-US" smtClean="0"/>
+              <a:pPr/>
               <a:t>4/18/2020</a:t>
             </a:fld>
             <a:endParaRPr lang="en-US"/>
@@ -6894,7 +6908,7 @@
         <p:spPr>
           <a:xfrm>
             <a:off x="1447800" y="1371600"/>
-            <a:ext cx="5334000" cy="2862322"/>
+            <a:ext cx="5334000" cy="3139321"/>
           </a:xfrm>
           <a:prstGeom prst="rect">
             <a:avLst/>
@@ -6932,7 +6946,6 @@
               <a:rPr lang="en-US" dirty="0" smtClean="0"/>
               <a:t>Debug a sample project</a:t>
             </a:r>
-            <a:endParaRPr lang="en-US" dirty="0" smtClean="0"/>
           </a:p>
           <a:p>
             <a:pPr marL="800100" lvl="1" indent="-342900">
@@ -6957,12 +6970,8 @@
               <a:buAutoNum type="arabicParenR"/>
             </a:pPr>
             <a:r>
-              <a:rPr lang="en-US" smtClean="0"/>
-              <a:t>Understanding  Step </a:t>
-            </a:r>
-            <a:r>
               <a:rPr lang="en-US" dirty="0" smtClean="0"/>
-              <a:t>Over</a:t>
+              <a:t>Understanding  Step Over</a:t>
             </a:r>
           </a:p>
           <a:p>
@@ -6973,7 +6982,6 @@
               <a:rPr lang="en-US" dirty="0" smtClean="0"/>
               <a:t>Short cuts used for debugging</a:t>
             </a:r>
-            <a:endParaRPr lang="en-US" dirty="0" smtClean="0"/>
           </a:p>
           <a:p>
             <a:pPr marL="800100" lvl="1" indent="-342900">
@@ -6999,8 +7007,26 @@
             </a:pPr>
             <a:r>
               <a:rPr lang="en-US" dirty="0" smtClean="0"/>
-              <a:t>Update variable in run time.</a:t>
-            </a:r>
+              <a:t>Update variable in run time</a:t>
+            </a:r>
+            <a:r>
+              <a:rPr lang="en-US" dirty="0" smtClean="0"/>
+              <a:t>.</a:t>
+            </a:r>
+          </a:p>
+          <a:p>
+            <a:pPr marL="800100" lvl="1" indent="-342900">
+              <a:buAutoNum type="arabicParenR"/>
+            </a:pPr>
+            <a:r>
+              <a:rPr lang="en-US" smtClean="0"/>
+              <a:t>Understanding Stack </a:t>
+            </a:r>
+            <a:r>
+              <a:rPr lang="en-US" dirty="0" smtClean="0"/>
+              <a:t>trace</a:t>
+            </a:r>
+            <a:endParaRPr lang="en-US" dirty="0" smtClean="0"/>
           </a:p>
         </p:txBody>
       </p:sp>

</xml_diff>